<commit_message>
change ipynb; change chap10_fig13
</commit_message>
<xml_diff>
--- a/figures/modeling/Yixuan_chap7.pptx
+++ b/figures/modeling/Yixuan_chap7.pptx
@@ -254,7 +254,7 @@
           <a:p>
             <a:fld id="{E3D17B11-CCD8-4EEC-AD7E-F410C1454966}" type="datetimeFigureOut">
               <a:rPr lang="zh-CN" altLang="en-US" smtClean="0"/>
-              <a:t>2021/12/26</a:t>
+              <a:t>2022/1/18</a:t>
             </a:fld>
             <a:endParaRPr lang="zh-CN" altLang="en-US"/>
           </a:p>
@@ -422,7 +422,7 @@
           <a:p>
             <a:fld id="{E3D17B11-CCD8-4EEC-AD7E-F410C1454966}" type="datetimeFigureOut">
               <a:rPr lang="zh-CN" altLang="en-US" smtClean="0"/>
-              <a:t>2021/12/26</a:t>
+              <a:t>2022/1/18</a:t>
             </a:fld>
             <a:endParaRPr lang="zh-CN" altLang="en-US"/>
           </a:p>
@@ -600,7 +600,7 @@
           <a:p>
             <a:fld id="{E3D17B11-CCD8-4EEC-AD7E-F410C1454966}" type="datetimeFigureOut">
               <a:rPr lang="zh-CN" altLang="en-US" smtClean="0"/>
-              <a:t>2021/12/26</a:t>
+              <a:t>2022/1/18</a:t>
             </a:fld>
             <a:endParaRPr lang="zh-CN" altLang="en-US"/>
           </a:p>
@@ -768,7 +768,7 @@
           <a:p>
             <a:fld id="{E3D17B11-CCD8-4EEC-AD7E-F410C1454966}" type="datetimeFigureOut">
               <a:rPr lang="zh-CN" altLang="en-US" smtClean="0"/>
-              <a:t>2021/12/26</a:t>
+              <a:t>2022/1/18</a:t>
             </a:fld>
             <a:endParaRPr lang="zh-CN" altLang="en-US"/>
           </a:p>
@@ -1013,7 +1013,7 @@
           <a:p>
             <a:fld id="{E3D17B11-CCD8-4EEC-AD7E-F410C1454966}" type="datetimeFigureOut">
               <a:rPr lang="zh-CN" altLang="en-US" smtClean="0"/>
-              <a:t>2021/12/26</a:t>
+              <a:t>2022/1/18</a:t>
             </a:fld>
             <a:endParaRPr lang="zh-CN" altLang="en-US"/>
           </a:p>
@@ -1242,7 +1242,7 @@
           <a:p>
             <a:fld id="{E3D17B11-CCD8-4EEC-AD7E-F410C1454966}" type="datetimeFigureOut">
               <a:rPr lang="zh-CN" altLang="en-US" smtClean="0"/>
-              <a:t>2021/12/26</a:t>
+              <a:t>2022/1/18</a:t>
             </a:fld>
             <a:endParaRPr lang="zh-CN" altLang="en-US"/>
           </a:p>
@@ -1606,7 +1606,7 @@
           <a:p>
             <a:fld id="{E3D17B11-CCD8-4EEC-AD7E-F410C1454966}" type="datetimeFigureOut">
               <a:rPr lang="zh-CN" altLang="en-US" smtClean="0"/>
-              <a:t>2021/12/26</a:t>
+              <a:t>2022/1/18</a:t>
             </a:fld>
             <a:endParaRPr lang="zh-CN" altLang="en-US"/>
           </a:p>
@@ -1723,7 +1723,7 @@
           <a:p>
             <a:fld id="{E3D17B11-CCD8-4EEC-AD7E-F410C1454966}" type="datetimeFigureOut">
               <a:rPr lang="zh-CN" altLang="en-US" smtClean="0"/>
-              <a:t>2021/12/26</a:t>
+              <a:t>2022/1/18</a:t>
             </a:fld>
             <a:endParaRPr lang="zh-CN" altLang="en-US"/>
           </a:p>
@@ -1818,7 +1818,7 @@
           <a:p>
             <a:fld id="{E3D17B11-CCD8-4EEC-AD7E-F410C1454966}" type="datetimeFigureOut">
               <a:rPr lang="zh-CN" altLang="en-US" smtClean="0"/>
-              <a:t>2021/12/26</a:t>
+              <a:t>2022/1/18</a:t>
             </a:fld>
             <a:endParaRPr lang="zh-CN" altLang="en-US"/>
           </a:p>
@@ -2093,7 +2093,7 @@
           <a:p>
             <a:fld id="{E3D17B11-CCD8-4EEC-AD7E-F410C1454966}" type="datetimeFigureOut">
               <a:rPr lang="zh-CN" altLang="en-US" smtClean="0"/>
-              <a:t>2021/12/26</a:t>
+              <a:t>2022/1/18</a:t>
             </a:fld>
             <a:endParaRPr lang="zh-CN" altLang="en-US"/>
           </a:p>
@@ -2345,7 +2345,7 @@
           <a:p>
             <a:fld id="{E3D17B11-CCD8-4EEC-AD7E-F410C1454966}" type="datetimeFigureOut">
               <a:rPr lang="zh-CN" altLang="en-US" smtClean="0"/>
-              <a:t>2021/12/26</a:t>
+              <a:t>2022/1/18</a:t>
             </a:fld>
             <a:endParaRPr lang="zh-CN" altLang="en-US"/>
           </a:p>
@@ -2556,7 +2556,7 @@
           <a:p>
             <a:fld id="{E3D17B11-CCD8-4EEC-AD7E-F410C1454966}" type="datetimeFigureOut">
               <a:rPr lang="zh-CN" altLang="en-US" smtClean="0"/>
-              <a:t>2021/12/26</a:t>
+              <a:t>2022/1/18</a:t>
             </a:fld>
             <a:endParaRPr lang="zh-CN" altLang="en-US"/>
           </a:p>
@@ -3521,6 +3521,106 @@
               <a:rPr lang="en-US" dirty="0"/>
               <a:t>.</a:t>
             </a:r>
+          </a:p>
+        </p:txBody>
+      </p:sp>
+      <p:sp>
+        <p:nvSpPr>
+          <p:cNvPr id="2" name="Rectangle 1">
+            <a:extLst>
+              <a:ext uri="{FF2B5EF4-FFF2-40B4-BE49-F238E27FC236}">
+                <a16:creationId xmlns:a16="http://schemas.microsoft.com/office/drawing/2014/main" id="{593F07E2-2BD6-3346-9108-4F066C6209A5}"/>
+              </a:ext>
+            </a:extLst>
+          </p:cNvPr>
+          <p:cNvSpPr/>
+          <p:nvPr/>
+        </p:nvSpPr>
+        <p:spPr>
+          <a:xfrm>
+            <a:off x="2452499" y="2468786"/>
+            <a:ext cx="2560320" cy="1935431"/>
+          </a:xfrm>
+          <a:prstGeom prst="rect">
+            <a:avLst/>
+          </a:prstGeom>
+          <a:noFill/>
+          <a:ln>
+            <a:noFill/>
+          </a:ln>
+        </p:spPr>
+        <p:style>
+          <a:lnRef idx="2">
+            <a:schemeClr val="accent1">
+              <a:shade val="50000"/>
+            </a:schemeClr>
+          </a:lnRef>
+          <a:fillRef idx="1">
+            <a:schemeClr val="accent1"/>
+          </a:fillRef>
+          <a:effectRef idx="0">
+            <a:schemeClr val="accent1"/>
+          </a:effectRef>
+          <a:fontRef idx="minor">
+            <a:schemeClr val="lt1"/>
+          </a:fontRef>
+        </p:style>
+        <p:txBody>
+          <a:bodyPr rtlCol="0" anchor="ctr"/>
+          <a:lstStyle/>
+          <a:p>
+            <a:pPr algn="ctr"/>
+            <a:endParaRPr lang="en-US"/>
+          </a:p>
+        </p:txBody>
+      </p:sp>
+      <p:sp>
+        <p:nvSpPr>
+          <p:cNvPr id="19" name="Rectangle 18">
+            <a:extLst>
+              <a:ext uri="{FF2B5EF4-FFF2-40B4-BE49-F238E27FC236}">
+                <a16:creationId xmlns:a16="http://schemas.microsoft.com/office/drawing/2014/main" id="{BC5883B8-67CD-974E-9636-D28A2AA0BDE1}"/>
+              </a:ext>
+            </a:extLst>
+          </p:cNvPr>
+          <p:cNvSpPr/>
+          <p:nvPr/>
+        </p:nvSpPr>
+        <p:spPr>
+          <a:xfrm>
+            <a:off x="7108252" y="2468785"/>
+            <a:ext cx="2560320" cy="1935431"/>
+          </a:xfrm>
+          <a:prstGeom prst="rect">
+            <a:avLst/>
+          </a:prstGeom>
+          <a:noFill/>
+          <a:ln>
+            <a:noFill/>
+          </a:ln>
+        </p:spPr>
+        <p:style>
+          <a:lnRef idx="2">
+            <a:schemeClr val="accent1">
+              <a:shade val="50000"/>
+            </a:schemeClr>
+          </a:lnRef>
+          <a:fillRef idx="1">
+            <a:schemeClr val="accent1"/>
+          </a:fillRef>
+          <a:effectRef idx="0">
+            <a:schemeClr val="accent1"/>
+          </a:effectRef>
+          <a:fontRef idx="minor">
+            <a:schemeClr val="lt1"/>
+          </a:fontRef>
+        </p:style>
+        <p:txBody>
+          <a:bodyPr rtlCol="0" anchor="ctr"/>
+          <a:lstStyle/>
+          <a:p>
+            <a:pPr algn="ctr"/>
+            <a:endParaRPr lang="en-US"/>
           </a:p>
         </p:txBody>
       </p:sp>

</xml_diff>

<commit_message>
change chap7 fig14 video for better size fit
</commit_message>
<xml_diff>
--- a/figures/modeling/Yixuan_chap7.pptx
+++ b/figures/modeling/Yixuan_chap7.pptx
@@ -255,7 +255,7 @@
           <a:p>
             <a:fld id="{E3D17B11-CCD8-4EEC-AD7E-F410C1454966}" type="datetimeFigureOut">
               <a:rPr lang="zh-CN" altLang="en-US" smtClean="0"/>
-              <a:t>2022/1/23</a:t>
+              <a:t>2022/1/24</a:t>
             </a:fld>
             <a:endParaRPr lang="zh-CN" altLang="en-US"/>
           </a:p>
@@ -423,7 +423,7 @@
           <a:p>
             <a:fld id="{E3D17B11-CCD8-4EEC-AD7E-F410C1454966}" type="datetimeFigureOut">
               <a:rPr lang="zh-CN" altLang="en-US" smtClean="0"/>
-              <a:t>2022/1/23</a:t>
+              <a:t>2022/1/24</a:t>
             </a:fld>
             <a:endParaRPr lang="zh-CN" altLang="en-US"/>
           </a:p>
@@ -601,7 +601,7 @@
           <a:p>
             <a:fld id="{E3D17B11-CCD8-4EEC-AD7E-F410C1454966}" type="datetimeFigureOut">
               <a:rPr lang="zh-CN" altLang="en-US" smtClean="0"/>
-              <a:t>2022/1/23</a:t>
+              <a:t>2022/1/24</a:t>
             </a:fld>
             <a:endParaRPr lang="zh-CN" altLang="en-US"/>
           </a:p>
@@ -769,7 +769,7 @@
           <a:p>
             <a:fld id="{E3D17B11-CCD8-4EEC-AD7E-F410C1454966}" type="datetimeFigureOut">
               <a:rPr lang="zh-CN" altLang="en-US" smtClean="0"/>
-              <a:t>2022/1/23</a:t>
+              <a:t>2022/1/24</a:t>
             </a:fld>
             <a:endParaRPr lang="zh-CN" altLang="en-US"/>
           </a:p>
@@ -1014,7 +1014,7 @@
           <a:p>
             <a:fld id="{E3D17B11-CCD8-4EEC-AD7E-F410C1454966}" type="datetimeFigureOut">
               <a:rPr lang="zh-CN" altLang="en-US" smtClean="0"/>
-              <a:t>2022/1/23</a:t>
+              <a:t>2022/1/24</a:t>
             </a:fld>
             <a:endParaRPr lang="zh-CN" altLang="en-US"/>
           </a:p>
@@ -1243,7 +1243,7 @@
           <a:p>
             <a:fld id="{E3D17B11-CCD8-4EEC-AD7E-F410C1454966}" type="datetimeFigureOut">
               <a:rPr lang="zh-CN" altLang="en-US" smtClean="0"/>
-              <a:t>2022/1/23</a:t>
+              <a:t>2022/1/24</a:t>
             </a:fld>
             <a:endParaRPr lang="zh-CN" altLang="en-US"/>
           </a:p>
@@ -1607,7 +1607,7 @@
           <a:p>
             <a:fld id="{E3D17B11-CCD8-4EEC-AD7E-F410C1454966}" type="datetimeFigureOut">
               <a:rPr lang="zh-CN" altLang="en-US" smtClean="0"/>
-              <a:t>2022/1/23</a:t>
+              <a:t>2022/1/24</a:t>
             </a:fld>
             <a:endParaRPr lang="zh-CN" altLang="en-US"/>
           </a:p>
@@ -1724,7 +1724,7 @@
           <a:p>
             <a:fld id="{E3D17B11-CCD8-4EEC-AD7E-F410C1454966}" type="datetimeFigureOut">
               <a:rPr lang="zh-CN" altLang="en-US" smtClean="0"/>
-              <a:t>2022/1/23</a:t>
+              <a:t>2022/1/24</a:t>
             </a:fld>
             <a:endParaRPr lang="zh-CN" altLang="en-US"/>
           </a:p>
@@ -1819,7 +1819,7 @@
           <a:p>
             <a:fld id="{E3D17B11-CCD8-4EEC-AD7E-F410C1454966}" type="datetimeFigureOut">
               <a:rPr lang="zh-CN" altLang="en-US" smtClean="0"/>
-              <a:t>2022/1/23</a:t>
+              <a:t>2022/1/24</a:t>
             </a:fld>
             <a:endParaRPr lang="zh-CN" altLang="en-US"/>
           </a:p>
@@ -2094,7 +2094,7 @@
           <a:p>
             <a:fld id="{E3D17B11-CCD8-4EEC-AD7E-F410C1454966}" type="datetimeFigureOut">
               <a:rPr lang="zh-CN" altLang="en-US" smtClean="0"/>
-              <a:t>2022/1/23</a:t>
+              <a:t>2022/1/24</a:t>
             </a:fld>
             <a:endParaRPr lang="zh-CN" altLang="en-US"/>
           </a:p>
@@ -2346,7 +2346,7 @@
           <a:p>
             <a:fld id="{E3D17B11-CCD8-4EEC-AD7E-F410C1454966}" type="datetimeFigureOut">
               <a:rPr lang="zh-CN" altLang="en-US" smtClean="0"/>
-              <a:t>2022/1/23</a:t>
+              <a:t>2022/1/24</a:t>
             </a:fld>
             <a:endParaRPr lang="zh-CN" altLang="en-US"/>
           </a:p>
@@ -2557,7 +2557,7 @@
           <a:p>
             <a:fld id="{E3D17B11-CCD8-4EEC-AD7E-F410C1454966}" type="datetimeFigureOut">
               <a:rPr lang="zh-CN" altLang="en-US" smtClean="0"/>
-              <a:t>2022/1/23</a:t>
+              <a:t>2022/1/24</a:t>
             </a:fld>
             <a:endParaRPr lang="zh-CN" altLang="en-US"/>
           </a:p>
@@ -3669,7 +3669,7 @@
         </p:nvSpPr>
         <p:spPr>
           <a:xfrm>
-            <a:off x="1676827" y="1428808"/>
+            <a:off x="3355202" y="1428808"/>
             <a:ext cx="2159566" cy="369332"/>
           </a:xfrm>
           <a:prstGeom prst="rect">
@@ -3704,7 +3704,7 @@
         </p:nvSpPr>
         <p:spPr>
           <a:xfrm>
-            <a:off x="2843986" y="3063793"/>
+            <a:off x="4522361" y="3063793"/>
             <a:ext cx="285514" cy="283497"/>
           </a:xfrm>
           <a:prstGeom prst="rect">
@@ -3758,7 +3758,7 @@
         </p:nvSpPr>
         <p:spPr>
           <a:xfrm>
-            <a:off x="2843985" y="3347291"/>
+            <a:off x="4522360" y="3347291"/>
             <a:ext cx="285521" cy="273586"/>
           </a:xfrm>
           <a:prstGeom prst="rect">
@@ -3812,7 +3812,7 @@
         </p:nvSpPr>
         <p:spPr>
           <a:xfrm>
-            <a:off x="1629732" y="3553458"/>
+            <a:off x="3308107" y="3553458"/>
             <a:ext cx="866263" cy="369332"/>
           </a:xfrm>
           <a:prstGeom prst="rect">
@@ -3850,7 +3850,7 @@
         </p:nvCxnSpPr>
         <p:spPr>
           <a:xfrm>
-            <a:off x="2555913" y="2236424"/>
+            <a:off x="4234288" y="2236424"/>
             <a:ext cx="1740665" cy="0"/>
           </a:xfrm>
           <a:prstGeom prst="line">
@@ -3888,7 +3888,7 @@
         </p:nvCxnSpPr>
         <p:spPr>
           <a:xfrm>
-            <a:off x="3986067" y="1966512"/>
+            <a:off x="5664442" y="1966512"/>
             <a:ext cx="0" cy="1867358"/>
           </a:xfrm>
           <a:prstGeom prst="line">
@@ -3924,7 +3924,7 @@
         </p:nvSpPr>
         <p:spPr>
           <a:xfrm>
-            <a:off x="3151971" y="3922790"/>
+            <a:off x="4830346" y="3922790"/>
             <a:ext cx="548548" cy="369332"/>
           </a:xfrm>
           <a:prstGeom prst="rect">
@@ -3962,7 +3962,7 @@
         </p:nvCxnSpPr>
         <p:spPr>
           <a:xfrm>
-            <a:off x="3700546" y="1966512"/>
+            <a:off x="5378921" y="1966512"/>
             <a:ext cx="0" cy="1867358"/>
           </a:xfrm>
           <a:prstGeom prst="line">
@@ -4000,7 +4000,7 @@
         </p:nvCxnSpPr>
         <p:spPr>
           <a:xfrm>
-            <a:off x="3415026" y="1966512"/>
+            <a:off x="5093401" y="1966512"/>
             <a:ext cx="0" cy="1867358"/>
           </a:xfrm>
           <a:prstGeom prst="line">
@@ -4038,7 +4038,7 @@
         </p:nvCxnSpPr>
         <p:spPr>
           <a:xfrm>
-            <a:off x="3129506" y="1966512"/>
+            <a:off x="4807881" y="1966512"/>
             <a:ext cx="0" cy="1867358"/>
           </a:xfrm>
           <a:prstGeom prst="line">
@@ -4076,7 +4076,7 @@
         </p:nvCxnSpPr>
         <p:spPr>
           <a:xfrm>
-            <a:off x="2843985" y="1966512"/>
+            <a:off x="4522360" y="1966512"/>
             <a:ext cx="0" cy="1867358"/>
           </a:xfrm>
           <a:prstGeom prst="line">
@@ -4114,7 +4114,7 @@
         </p:nvCxnSpPr>
         <p:spPr>
           <a:xfrm>
-            <a:off x="2555913" y="2513315"/>
+            <a:off x="4234288" y="2513315"/>
             <a:ext cx="1740665" cy="0"/>
           </a:xfrm>
           <a:prstGeom prst="line">
@@ -4152,7 +4152,7 @@
         </p:nvCxnSpPr>
         <p:spPr>
           <a:xfrm>
-            <a:off x="2555913" y="2790206"/>
+            <a:off x="4234288" y="2790206"/>
             <a:ext cx="1740665" cy="0"/>
           </a:xfrm>
           <a:prstGeom prst="line">
@@ -4190,7 +4190,7 @@
         </p:nvCxnSpPr>
         <p:spPr>
           <a:xfrm>
-            <a:off x="2555913" y="3067097"/>
+            <a:off x="4234288" y="3067097"/>
             <a:ext cx="1740665" cy="0"/>
           </a:xfrm>
           <a:prstGeom prst="line">
@@ -4228,7 +4228,7 @@
         </p:nvCxnSpPr>
         <p:spPr>
           <a:xfrm>
-            <a:off x="2555913" y="3343988"/>
+            <a:off x="4234288" y="3343988"/>
             <a:ext cx="1740665" cy="0"/>
           </a:xfrm>
           <a:prstGeom prst="line">
@@ -4266,7 +4266,7 @@
         </p:nvCxnSpPr>
         <p:spPr>
           <a:xfrm>
-            <a:off x="2555913" y="3620877"/>
+            <a:off x="4234288" y="3620877"/>
             <a:ext cx="1740665" cy="0"/>
           </a:xfrm>
           <a:prstGeom prst="line">
@@ -4302,7 +4302,7 @@
         </p:nvSpPr>
         <p:spPr>
           <a:xfrm>
-            <a:off x="2843778" y="2786902"/>
+            <a:off x="4522153" y="2786902"/>
             <a:ext cx="285511" cy="273590"/>
           </a:xfrm>
           <a:prstGeom prst="rect">
@@ -4356,7 +4356,7 @@
         </p:nvSpPr>
         <p:spPr>
           <a:xfrm>
-            <a:off x="3129288" y="2786902"/>
+            <a:off x="4807663" y="2786902"/>
             <a:ext cx="285514" cy="273588"/>
           </a:xfrm>
           <a:prstGeom prst="rect">
@@ -4410,7 +4410,7 @@
         </p:nvSpPr>
         <p:spPr>
           <a:xfrm>
-            <a:off x="3130241" y="2513307"/>
+            <a:off x="4808616" y="2513307"/>
             <a:ext cx="285514" cy="273588"/>
           </a:xfrm>
           <a:prstGeom prst="rect">
@@ -4464,7 +4464,7 @@
         </p:nvSpPr>
         <p:spPr>
           <a:xfrm>
-            <a:off x="3414357" y="2513312"/>
+            <a:off x="5092732" y="2513312"/>
             <a:ext cx="285501" cy="273588"/>
           </a:xfrm>
           <a:prstGeom prst="rect">
@@ -4518,7 +4518,7 @@
         </p:nvSpPr>
         <p:spPr>
           <a:xfrm>
-            <a:off x="3414080" y="2236418"/>
+            <a:off x="5092455" y="2236418"/>
             <a:ext cx="285514" cy="273588"/>
           </a:xfrm>
           <a:prstGeom prst="rect">
@@ -4572,7 +4572,7 @@
         </p:nvSpPr>
         <p:spPr>
           <a:xfrm>
-            <a:off x="3698516" y="2239720"/>
+            <a:off x="5376891" y="2239720"/>
             <a:ext cx="284819" cy="273588"/>
           </a:xfrm>
           <a:prstGeom prst="rect">
@@ -4626,7 +4626,7 @@
         </p:nvSpPr>
         <p:spPr>
           <a:xfrm>
-            <a:off x="2930492" y="2313557"/>
+            <a:off x="4608867" y="2313557"/>
             <a:ext cx="1156766" cy="1496443"/>
           </a:xfrm>
           <a:custGeom>
@@ -4709,7 +4709,7 @@
         </p:nvSpPr>
         <p:spPr>
           <a:xfrm>
-            <a:off x="4661904" y="2233120"/>
+            <a:off x="6340279" y="2233120"/>
             <a:ext cx="284819" cy="273588"/>
           </a:xfrm>
           <a:prstGeom prst="rect">
@@ -4763,7 +4763,7 @@
         </p:nvSpPr>
         <p:spPr>
           <a:xfrm>
-            <a:off x="4992425" y="2185248"/>
+            <a:off x="6670800" y="2185248"/>
             <a:ext cx="1238159" cy="369332"/>
           </a:xfrm>
           <a:prstGeom prst="rect">
@@ -4800,7 +4800,7 @@
         </p:nvSpPr>
         <p:spPr>
           <a:xfrm>
-            <a:off x="3368007" y="3023304"/>
+            <a:off x="5046382" y="3023304"/>
             <a:ext cx="91440" cy="91440"/>
           </a:xfrm>
           <a:prstGeom prst="ellipse">
@@ -4854,7 +4854,7 @@
         </p:nvSpPr>
         <p:spPr>
           <a:xfrm>
-            <a:off x="3368007" y="2741623"/>
+            <a:off x="5046382" y="2741623"/>
             <a:ext cx="91440" cy="91440"/>
           </a:xfrm>
           <a:prstGeom prst="ellipse">
@@ -4908,7 +4908,7 @@
         </p:nvSpPr>
         <p:spPr>
           <a:xfrm>
-            <a:off x="3368007" y="2467529"/>
+            <a:off x="5046382" y="2467529"/>
             <a:ext cx="91440" cy="91440"/>
           </a:xfrm>
           <a:prstGeom prst="ellipse">
@@ -4962,7 +4962,7 @@
         </p:nvSpPr>
         <p:spPr>
           <a:xfrm>
-            <a:off x="3081572" y="3023304"/>
+            <a:off x="4759947" y="3023304"/>
             <a:ext cx="91440" cy="91440"/>
           </a:xfrm>
           <a:prstGeom prst="ellipse">
@@ -5016,7 +5016,7 @@
         </p:nvSpPr>
         <p:spPr>
           <a:xfrm>
-            <a:off x="3081572" y="2741623"/>
+            <a:off x="4759947" y="2741623"/>
             <a:ext cx="91440" cy="91440"/>
           </a:xfrm>
           <a:prstGeom prst="ellipse">
@@ -5070,7 +5070,7 @@
         </p:nvSpPr>
         <p:spPr>
           <a:xfrm>
-            <a:off x="3081572" y="2467529"/>
+            <a:off x="4759947" y="2467529"/>
             <a:ext cx="91440" cy="91440"/>
           </a:xfrm>
           <a:prstGeom prst="ellipse">
@@ -5124,7 +5124,7 @@
         </p:nvSpPr>
         <p:spPr>
           <a:xfrm>
-            <a:off x="2798854" y="3296533"/>
+            <a:off x="4477229" y="3296533"/>
             <a:ext cx="91440" cy="91440"/>
           </a:xfrm>
           <a:prstGeom prst="ellipse">
@@ -5178,7 +5178,7 @@
         </p:nvSpPr>
         <p:spPr>
           <a:xfrm>
-            <a:off x="2798854" y="3023304"/>
+            <a:off x="4477229" y="3023304"/>
             <a:ext cx="91440" cy="91440"/>
           </a:xfrm>
           <a:prstGeom prst="ellipse">
@@ -5232,7 +5232,7 @@
         </p:nvSpPr>
         <p:spPr>
           <a:xfrm>
-            <a:off x="2798854" y="2741623"/>
+            <a:off x="4477229" y="2741623"/>
             <a:ext cx="91440" cy="91440"/>
           </a:xfrm>
           <a:prstGeom prst="ellipse">
@@ -5286,7 +5286,7 @@
         </p:nvSpPr>
         <p:spPr>
           <a:xfrm>
-            <a:off x="3655302" y="2741623"/>
+            <a:off x="5333677" y="2741623"/>
             <a:ext cx="91440" cy="91440"/>
           </a:xfrm>
           <a:prstGeom prst="ellipse">
@@ -5340,7 +5340,7 @@
         </p:nvSpPr>
         <p:spPr>
           <a:xfrm>
-            <a:off x="3655302" y="2467529"/>
+            <a:off x="5333677" y="2467529"/>
             <a:ext cx="91440" cy="91440"/>
           </a:xfrm>
           <a:prstGeom prst="ellipse">
@@ -5394,7 +5394,7 @@
         </p:nvSpPr>
         <p:spPr>
           <a:xfrm>
-            <a:off x="3655302" y="2185707"/>
+            <a:off x="5333677" y="2185707"/>
             <a:ext cx="91440" cy="91440"/>
           </a:xfrm>
           <a:prstGeom prst="ellipse">
@@ -5448,7 +5448,7 @@
         </p:nvSpPr>
         <p:spPr>
           <a:xfrm>
-            <a:off x="3081572" y="3296533"/>
+            <a:off x="4759947" y="3296533"/>
             <a:ext cx="91440" cy="91440"/>
           </a:xfrm>
           <a:prstGeom prst="ellipse">
@@ -5502,7 +5502,7 @@
         </p:nvSpPr>
         <p:spPr>
           <a:xfrm>
-            <a:off x="3081572" y="3578041"/>
+            <a:off x="4759947" y="3578041"/>
             <a:ext cx="91440" cy="91440"/>
           </a:xfrm>
           <a:prstGeom prst="ellipse">
@@ -5556,7 +5556,7 @@
         </p:nvSpPr>
         <p:spPr>
           <a:xfrm>
-            <a:off x="2798854" y="3578041"/>
+            <a:off x="4477229" y="3578041"/>
             <a:ext cx="91440" cy="91440"/>
           </a:xfrm>
           <a:prstGeom prst="ellipse">
@@ -5610,7 +5610,7 @@
         </p:nvSpPr>
         <p:spPr>
           <a:xfrm>
-            <a:off x="3368007" y="2185707"/>
+            <a:off x="5046382" y="2185707"/>
             <a:ext cx="91440" cy="91440"/>
           </a:xfrm>
           <a:prstGeom prst="ellipse">
@@ -5664,7 +5664,7 @@
         </p:nvSpPr>
         <p:spPr>
           <a:xfrm>
-            <a:off x="3938914" y="2467529"/>
+            <a:off x="5617289" y="2467529"/>
             <a:ext cx="91440" cy="91440"/>
           </a:xfrm>
           <a:prstGeom prst="ellipse">
@@ -5718,7 +5718,7 @@
         </p:nvSpPr>
         <p:spPr>
           <a:xfrm>
-            <a:off x="3938914" y="2185707"/>
+            <a:off x="5617289" y="2185707"/>
             <a:ext cx="91440" cy="91440"/>
           </a:xfrm>
           <a:prstGeom prst="ellipse">
@@ -5772,7 +5772,7 @@
         </p:nvSpPr>
         <p:spPr>
           <a:xfrm>
-            <a:off x="3938914" y="2741623"/>
+            <a:off x="5617289" y="2741623"/>
             <a:ext cx="91440" cy="91440"/>
           </a:xfrm>
           <a:prstGeom prst="ellipse">
@@ -5826,7 +5826,7 @@
         </p:nvSpPr>
         <p:spPr>
           <a:xfrm>
-            <a:off x="3938914" y="3023304"/>
+            <a:off x="5617289" y="3023304"/>
             <a:ext cx="91440" cy="91440"/>
           </a:xfrm>
           <a:prstGeom prst="ellipse">
@@ -5880,7 +5880,7 @@
         </p:nvSpPr>
         <p:spPr>
           <a:xfrm>
-            <a:off x="3938914" y="3296533"/>
+            <a:off x="5617289" y="3296533"/>
             <a:ext cx="91440" cy="91440"/>
           </a:xfrm>
           <a:prstGeom prst="ellipse">
@@ -5934,7 +5934,7 @@
         </p:nvSpPr>
         <p:spPr>
           <a:xfrm>
-            <a:off x="3938914" y="3578041"/>
+            <a:off x="5617289" y="3578041"/>
             <a:ext cx="91440" cy="91440"/>
           </a:xfrm>
           <a:prstGeom prst="ellipse">
@@ -5988,7 +5988,7 @@
         </p:nvSpPr>
         <p:spPr>
           <a:xfrm>
-            <a:off x="2798854" y="2185707"/>
+            <a:off x="4477229" y="2185707"/>
             <a:ext cx="91440" cy="91440"/>
           </a:xfrm>
           <a:prstGeom prst="ellipse">
@@ -6042,7 +6042,7 @@
         </p:nvSpPr>
         <p:spPr>
           <a:xfrm>
-            <a:off x="3081572" y="2185707"/>
+            <a:off x="4759947" y="2185707"/>
             <a:ext cx="91440" cy="91440"/>
           </a:xfrm>
           <a:prstGeom prst="ellipse">
@@ -6096,7 +6096,7 @@
         </p:nvSpPr>
         <p:spPr>
           <a:xfrm>
-            <a:off x="2798854" y="2467529"/>
+            <a:off x="4477229" y="2467529"/>
             <a:ext cx="91440" cy="91440"/>
           </a:xfrm>
           <a:prstGeom prst="ellipse">
@@ -6150,7 +6150,7 @@
         </p:nvSpPr>
         <p:spPr>
           <a:xfrm>
-            <a:off x="3655302" y="3023304"/>
+            <a:off x="5333677" y="3023304"/>
             <a:ext cx="91440" cy="91440"/>
           </a:xfrm>
           <a:prstGeom prst="ellipse">
@@ -6204,7 +6204,7 @@
         </p:nvSpPr>
         <p:spPr>
           <a:xfrm>
-            <a:off x="3655302" y="3296533"/>
+            <a:off x="5333677" y="3296533"/>
             <a:ext cx="91440" cy="91440"/>
           </a:xfrm>
           <a:prstGeom prst="ellipse">
@@ -6258,7 +6258,7 @@
         </p:nvSpPr>
         <p:spPr>
           <a:xfrm>
-            <a:off x="3655302" y="3578041"/>
+            <a:off x="5333677" y="3578041"/>
             <a:ext cx="91440" cy="91440"/>
           </a:xfrm>
           <a:prstGeom prst="ellipse">
@@ -6312,7 +6312,7 @@
         </p:nvSpPr>
         <p:spPr>
           <a:xfrm>
-            <a:off x="3368007" y="3296533"/>
+            <a:off x="5046382" y="3296533"/>
             <a:ext cx="91440" cy="91440"/>
           </a:xfrm>
           <a:prstGeom prst="ellipse">
@@ -6366,7 +6366,7 @@
         </p:nvSpPr>
         <p:spPr>
           <a:xfrm>
-            <a:off x="3368007" y="3578041"/>
+            <a:off x="5046382" y="3578041"/>
             <a:ext cx="91440" cy="91440"/>
           </a:xfrm>
           <a:prstGeom prst="ellipse">
@@ -6420,7 +6420,7 @@
         </p:nvSpPr>
         <p:spPr>
           <a:xfrm>
-            <a:off x="4755555" y="2755961"/>
+            <a:off x="6433930" y="2755961"/>
             <a:ext cx="91440" cy="91440"/>
           </a:xfrm>
           <a:prstGeom prst="ellipse">
@@ -6472,7 +6472,7 @@
         </p:nvSpPr>
         <p:spPr>
           <a:xfrm>
-            <a:off x="4992425" y="2617015"/>
+            <a:off x="6670800" y="2617015"/>
             <a:ext cx="1038746" cy="369332"/>
           </a:xfrm>
           <a:prstGeom prst="rect">
@@ -6509,7 +6509,7 @@
         </p:nvSpPr>
         <p:spPr>
           <a:xfrm>
-            <a:off x="4755555" y="3187728"/>
+            <a:off x="6433930" y="3187728"/>
             <a:ext cx="91440" cy="91440"/>
           </a:xfrm>
           <a:prstGeom prst="ellipse">
@@ -6561,7 +6561,7 @@
         </p:nvSpPr>
         <p:spPr>
           <a:xfrm>
-            <a:off x="4992425" y="3048782"/>
+            <a:off x="6670800" y="3048782"/>
             <a:ext cx="1489318" cy="369332"/>
           </a:xfrm>
           <a:prstGeom prst="rect">
@@ -6596,7 +6596,7 @@
         </p:nvSpPr>
         <p:spPr>
           <a:xfrm>
-            <a:off x="4992425" y="3480549"/>
+            <a:off x="6670800" y="3480549"/>
             <a:ext cx="1218475" cy="369332"/>
           </a:xfrm>
           <a:prstGeom prst="rect">
@@ -6631,7 +6631,7 @@
         </p:nvSpPr>
         <p:spPr>
           <a:xfrm>
-            <a:off x="4992425" y="3912316"/>
+            <a:off x="6670800" y="3912316"/>
             <a:ext cx="441468" cy="369332"/>
           </a:xfrm>
           <a:prstGeom prst="rect">
@@ -6668,7 +6668,7 @@
         </p:nvSpPr>
         <p:spPr>
           <a:xfrm>
-            <a:off x="4755555" y="3613885"/>
+            <a:off x="6433930" y="3613885"/>
             <a:ext cx="91440" cy="91440"/>
           </a:xfrm>
           <a:prstGeom prst="ellipse">
@@ -6722,7 +6722,7 @@
         </p:nvSpPr>
         <p:spPr>
           <a:xfrm>
-            <a:off x="4761195" y="4051262"/>
+            <a:off x="6439570" y="4051262"/>
             <a:ext cx="91440" cy="91440"/>
           </a:xfrm>
           <a:prstGeom prst="ellipse">
@@ -6774,7 +6774,7 @@
         </p:nvSpPr>
         <p:spPr>
           <a:xfrm>
-            <a:off x="1676827" y="1428808"/>
+            <a:off x="3355202" y="1428808"/>
             <a:ext cx="3081228" cy="369332"/>
           </a:xfrm>
           <a:prstGeom prst="rect">
@@ -6811,7 +6811,7 @@
         </p:nvSpPr>
         <p:spPr>
           <a:xfrm>
-            <a:off x="3655302" y="2467529"/>
+            <a:off x="5333677" y="2467529"/>
             <a:ext cx="91440" cy="91440"/>
           </a:xfrm>
           <a:prstGeom prst="ellipse">
@@ -6863,7 +6863,7 @@
         </p:nvSpPr>
         <p:spPr>
           <a:xfrm>
-            <a:off x="3673593" y="1983156"/>
+            <a:off x="5351968" y="1983156"/>
             <a:ext cx="364202" cy="261610"/>
           </a:xfrm>
           <a:prstGeom prst="rect">
@@ -6898,7 +6898,7 @@
         </p:nvSpPr>
         <p:spPr>
           <a:xfrm>
-            <a:off x="3386045" y="1983156"/>
+            <a:off x="5064420" y="1983156"/>
             <a:ext cx="356188" cy="253916"/>
           </a:xfrm>
           <a:prstGeom prst="rect">
@@ -6933,7 +6933,7 @@
         </p:nvSpPr>
         <p:spPr>
           <a:xfrm>
-            <a:off x="3098497" y="1983156"/>
+            <a:off x="4776872" y="1983156"/>
             <a:ext cx="356188" cy="253916"/>
           </a:xfrm>
           <a:prstGeom prst="rect">
@@ -6968,7 +6968,7 @@
         </p:nvSpPr>
         <p:spPr>
           <a:xfrm>
-            <a:off x="3947000" y="2259849"/>
+            <a:off x="5625375" y="2259849"/>
             <a:ext cx="397866" cy="253916"/>
           </a:xfrm>
           <a:prstGeom prst="rect">
@@ -7003,7 +7003,7 @@
         </p:nvSpPr>
         <p:spPr>
           <a:xfrm>
-            <a:off x="3639929" y="2259849"/>
+            <a:off x="5318304" y="2259849"/>
             <a:ext cx="397866" cy="253916"/>
           </a:xfrm>
           <a:prstGeom prst="rect">
@@ -7038,7 +7038,7 @@
         </p:nvSpPr>
         <p:spPr>
           <a:xfrm>
-            <a:off x="3098497" y="2259849"/>
+            <a:off x="4776872" y="2259849"/>
             <a:ext cx="356188" cy="253916"/>
           </a:xfrm>
           <a:prstGeom prst="rect">
@@ -7073,7 +7073,7 @@
         </p:nvSpPr>
         <p:spPr>
           <a:xfrm>
-            <a:off x="2814132" y="2259849"/>
+            <a:off x="4492507" y="2259849"/>
             <a:ext cx="356188" cy="253916"/>
           </a:xfrm>
           <a:prstGeom prst="rect">
@@ -7108,7 +7108,7 @@
         </p:nvSpPr>
         <p:spPr>
           <a:xfrm>
-            <a:off x="2531892" y="2526983"/>
+            <a:off x="4210267" y="2526983"/>
             <a:ext cx="356188" cy="253916"/>
           </a:xfrm>
           <a:prstGeom prst="rect">
@@ -7143,7 +7143,7 @@
         </p:nvSpPr>
         <p:spPr>
           <a:xfrm>
-            <a:off x="2814132" y="2526983"/>
+            <a:off x="4492507" y="2526983"/>
             <a:ext cx="356188" cy="253916"/>
           </a:xfrm>
           <a:prstGeom prst="rect">
@@ -7178,7 +7178,7 @@
         </p:nvSpPr>
         <p:spPr>
           <a:xfrm>
-            <a:off x="3344367" y="2526983"/>
+            <a:off x="5022742" y="2526983"/>
             <a:ext cx="397866" cy="253916"/>
           </a:xfrm>
           <a:prstGeom prst="rect">
@@ -7213,7 +7213,7 @@
         </p:nvSpPr>
         <p:spPr>
           <a:xfrm>
-            <a:off x="3639929" y="2526983"/>
+            <a:off x="5318304" y="2526983"/>
             <a:ext cx="397866" cy="253916"/>
           </a:xfrm>
           <a:prstGeom prst="rect">
@@ -7248,7 +7248,7 @@
         </p:nvSpPr>
         <p:spPr>
           <a:xfrm>
-            <a:off x="2531892" y="2808198"/>
+            <a:off x="4210267" y="2808198"/>
             <a:ext cx="356188" cy="253916"/>
           </a:xfrm>
           <a:prstGeom prst="rect">
@@ -7283,7 +7283,7 @@
         </p:nvSpPr>
         <p:spPr>
           <a:xfrm>
-            <a:off x="2531892" y="3089413"/>
+            <a:off x="4210267" y="3089413"/>
             <a:ext cx="356188" cy="253916"/>
           </a:xfrm>
           <a:prstGeom prst="rect">
@@ -7318,7 +7318,7 @@
         </p:nvSpPr>
         <p:spPr>
           <a:xfrm>
-            <a:off x="2531892" y="3370628"/>
+            <a:off x="4210267" y="3370628"/>
             <a:ext cx="356188" cy="253916"/>
           </a:xfrm>
           <a:prstGeom prst="rect">
@@ -7353,7 +7353,7 @@
         </p:nvSpPr>
         <p:spPr>
           <a:xfrm>
-            <a:off x="3056819" y="3370628"/>
+            <a:off x="4735194" y="3370628"/>
             <a:ext cx="397866" cy="253916"/>
           </a:xfrm>
           <a:prstGeom prst="rect">
@@ -7388,7 +7388,7 @@
         </p:nvSpPr>
         <p:spPr>
           <a:xfrm>
-            <a:off x="3056819" y="3090409"/>
+            <a:off x="4735194" y="3090409"/>
             <a:ext cx="397866" cy="253916"/>
           </a:xfrm>
           <a:prstGeom prst="rect">
@@ -7423,7 +7423,7 @@
         </p:nvSpPr>
         <p:spPr>
           <a:xfrm>
-            <a:off x="3056819" y="2808198"/>
+            <a:off x="4735194" y="2808198"/>
             <a:ext cx="397866" cy="253916"/>
           </a:xfrm>
           <a:prstGeom prst="rect">
@@ -7458,7 +7458,7 @@
         </p:nvSpPr>
         <p:spPr>
           <a:xfrm>
-            <a:off x="3344367" y="2808198"/>
+            <a:off x="5022742" y="2808198"/>
             <a:ext cx="397866" cy="253916"/>
           </a:xfrm>
           <a:prstGeom prst="rect">
@@ -7657,7 +7657,7 @@
         </p:nvSpPr>
         <p:spPr>
           <a:xfrm>
-            <a:off x="1676827" y="1428808"/>
+            <a:off x="3355202" y="1428808"/>
             <a:ext cx="3213316" cy="369332"/>
           </a:xfrm>
           <a:prstGeom prst="rect">
@@ -7692,7 +7692,7 @@
         </p:nvSpPr>
         <p:spPr>
           <a:xfrm>
-            <a:off x="2843986" y="3063793"/>
+            <a:off x="4522361" y="3063793"/>
             <a:ext cx="285514" cy="283497"/>
           </a:xfrm>
           <a:prstGeom prst="rect">
@@ -7746,7 +7746,7 @@
         </p:nvSpPr>
         <p:spPr>
           <a:xfrm>
-            <a:off x="2843985" y="3347291"/>
+            <a:off x="4522360" y="3347291"/>
             <a:ext cx="285521" cy="273586"/>
           </a:xfrm>
           <a:prstGeom prst="rect">
@@ -7800,7 +7800,7 @@
         </p:nvSpPr>
         <p:spPr>
           <a:xfrm>
-            <a:off x="1629732" y="3553458"/>
+            <a:off x="3308107" y="3553458"/>
             <a:ext cx="866263" cy="369332"/>
           </a:xfrm>
           <a:prstGeom prst="rect">
@@ -7838,7 +7838,7 @@
         </p:nvCxnSpPr>
         <p:spPr>
           <a:xfrm>
-            <a:off x="2555913" y="2236424"/>
+            <a:off x="4234288" y="2236424"/>
             <a:ext cx="1740665" cy="0"/>
           </a:xfrm>
           <a:prstGeom prst="line">
@@ -7876,7 +7876,7 @@
         </p:nvCxnSpPr>
         <p:spPr>
           <a:xfrm>
-            <a:off x="3986067" y="1966512"/>
+            <a:off x="5664442" y="1966512"/>
             <a:ext cx="0" cy="1867358"/>
           </a:xfrm>
           <a:prstGeom prst="line">
@@ -7912,7 +7912,7 @@
         </p:nvSpPr>
         <p:spPr>
           <a:xfrm>
-            <a:off x="3151971" y="3922790"/>
+            <a:off x="4830346" y="3922790"/>
             <a:ext cx="548548" cy="369332"/>
           </a:xfrm>
           <a:prstGeom prst="rect">
@@ -7950,7 +7950,7 @@
         </p:nvCxnSpPr>
         <p:spPr>
           <a:xfrm>
-            <a:off x="3700546" y="1966512"/>
+            <a:off x="5378921" y="1966512"/>
             <a:ext cx="0" cy="1867358"/>
           </a:xfrm>
           <a:prstGeom prst="line">
@@ -7988,7 +7988,7 @@
         </p:nvCxnSpPr>
         <p:spPr>
           <a:xfrm>
-            <a:off x="3415026" y="1966512"/>
+            <a:off x="5093401" y="1966512"/>
             <a:ext cx="0" cy="1867358"/>
           </a:xfrm>
           <a:prstGeom prst="line">
@@ -8026,7 +8026,7 @@
         </p:nvCxnSpPr>
         <p:spPr>
           <a:xfrm>
-            <a:off x="3129506" y="1966512"/>
+            <a:off x="4807881" y="1966512"/>
             <a:ext cx="0" cy="1867358"/>
           </a:xfrm>
           <a:prstGeom prst="line">
@@ -8064,7 +8064,7 @@
         </p:nvCxnSpPr>
         <p:spPr>
           <a:xfrm>
-            <a:off x="2843985" y="1966512"/>
+            <a:off x="4522360" y="1966512"/>
             <a:ext cx="0" cy="1867358"/>
           </a:xfrm>
           <a:prstGeom prst="line">
@@ -8102,7 +8102,7 @@
         </p:nvCxnSpPr>
         <p:spPr>
           <a:xfrm>
-            <a:off x="2555913" y="2513315"/>
+            <a:off x="4234288" y="2513315"/>
             <a:ext cx="1740665" cy="0"/>
           </a:xfrm>
           <a:prstGeom prst="line">
@@ -8140,7 +8140,7 @@
         </p:nvCxnSpPr>
         <p:spPr>
           <a:xfrm>
-            <a:off x="2555913" y="2790206"/>
+            <a:off x="4234288" y="2790206"/>
             <a:ext cx="1740665" cy="0"/>
           </a:xfrm>
           <a:prstGeom prst="line">
@@ -8178,7 +8178,7 @@
         </p:nvCxnSpPr>
         <p:spPr>
           <a:xfrm>
-            <a:off x="2555913" y="3067097"/>
+            <a:off x="4234288" y="3067097"/>
             <a:ext cx="1740665" cy="0"/>
           </a:xfrm>
           <a:prstGeom prst="line">
@@ -8216,7 +8216,7 @@
         </p:nvCxnSpPr>
         <p:spPr>
           <a:xfrm>
-            <a:off x="2555913" y="3343988"/>
+            <a:off x="4234288" y="3343988"/>
             <a:ext cx="1740665" cy="0"/>
           </a:xfrm>
           <a:prstGeom prst="line">
@@ -8254,7 +8254,7 @@
         </p:nvCxnSpPr>
         <p:spPr>
           <a:xfrm>
-            <a:off x="2555913" y="3620877"/>
+            <a:off x="4234288" y="3620877"/>
             <a:ext cx="1740665" cy="0"/>
           </a:xfrm>
           <a:prstGeom prst="line">
@@ -8290,7 +8290,7 @@
         </p:nvSpPr>
         <p:spPr>
           <a:xfrm>
-            <a:off x="2843778" y="2786902"/>
+            <a:off x="4522153" y="2786902"/>
             <a:ext cx="285511" cy="273590"/>
           </a:xfrm>
           <a:prstGeom prst="rect">
@@ -8344,7 +8344,7 @@
         </p:nvSpPr>
         <p:spPr>
           <a:xfrm>
-            <a:off x="3129288" y="2786902"/>
+            <a:off x="4807663" y="2786902"/>
             <a:ext cx="285514" cy="273588"/>
           </a:xfrm>
           <a:prstGeom prst="rect">
@@ -8398,7 +8398,7 @@
         </p:nvSpPr>
         <p:spPr>
           <a:xfrm>
-            <a:off x="3130241" y="2513307"/>
+            <a:off x="4808616" y="2513307"/>
             <a:ext cx="285514" cy="273588"/>
           </a:xfrm>
           <a:prstGeom prst="rect">
@@ -8452,7 +8452,7 @@
         </p:nvSpPr>
         <p:spPr>
           <a:xfrm>
-            <a:off x="3414357" y="2513312"/>
+            <a:off x="5092732" y="2513312"/>
             <a:ext cx="285501" cy="273588"/>
           </a:xfrm>
           <a:prstGeom prst="rect">
@@ -8506,7 +8506,7 @@
         </p:nvSpPr>
         <p:spPr>
           <a:xfrm>
-            <a:off x="3414080" y="2236418"/>
+            <a:off x="5092455" y="2236418"/>
             <a:ext cx="285514" cy="273588"/>
           </a:xfrm>
           <a:prstGeom prst="rect">
@@ -8560,7 +8560,7 @@
         </p:nvSpPr>
         <p:spPr>
           <a:xfrm>
-            <a:off x="3698516" y="2239720"/>
+            <a:off x="5376891" y="2239720"/>
             <a:ext cx="284819" cy="273588"/>
           </a:xfrm>
           <a:prstGeom prst="rect">
@@ -8614,7 +8614,7 @@
         </p:nvSpPr>
         <p:spPr>
           <a:xfrm>
-            <a:off x="2930492" y="2313557"/>
+            <a:off x="4608867" y="2313557"/>
             <a:ext cx="1156766" cy="1496443"/>
           </a:xfrm>
           <a:custGeom>
@@ -8697,7 +8697,7 @@
         </p:nvSpPr>
         <p:spPr>
           <a:xfrm>
-            <a:off x="4661904" y="2233120"/>
+            <a:off x="6340279" y="2233120"/>
             <a:ext cx="284819" cy="273588"/>
           </a:xfrm>
           <a:prstGeom prst="rect">
@@ -8751,7 +8751,7 @@
         </p:nvSpPr>
         <p:spPr>
           <a:xfrm>
-            <a:off x="4992425" y="2185248"/>
+            <a:off x="6670800" y="2185248"/>
             <a:ext cx="1238159" cy="369332"/>
           </a:xfrm>
           <a:prstGeom prst="rect">
@@ -8788,7 +8788,7 @@
         </p:nvSpPr>
         <p:spPr>
           <a:xfrm>
-            <a:off x="3368007" y="3023304"/>
+            <a:off x="5046382" y="3023304"/>
             <a:ext cx="91440" cy="91440"/>
           </a:xfrm>
           <a:prstGeom prst="ellipse">
@@ -8842,7 +8842,7 @@
         </p:nvSpPr>
         <p:spPr>
           <a:xfrm>
-            <a:off x="3368007" y="2741623"/>
+            <a:off x="5046382" y="2741623"/>
             <a:ext cx="91440" cy="91440"/>
           </a:xfrm>
           <a:prstGeom prst="ellipse">
@@ -8896,7 +8896,7 @@
         </p:nvSpPr>
         <p:spPr>
           <a:xfrm>
-            <a:off x="3368007" y="2467529"/>
+            <a:off x="5046382" y="2467529"/>
             <a:ext cx="91440" cy="91440"/>
           </a:xfrm>
           <a:prstGeom prst="ellipse">
@@ -8950,7 +8950,7 @@
         </p:nvSpPr>
         <p:spPr>
           <a:xfrm>
-            <a:off x="3081572" y="3023304"/>
+            <a:off x="4759947" y="3023304"/>
             <a:ext cx="91440" cy="91440"/>
           </a:xfrm>
           <a:prstGeom prst="ellipse">
@@ -9004,7 +9004,7 @@
         </p:nvSpPr>
         <p:spPr>
           <a:xfrm>
-            <a:off x="3081572" y="2741623"/>
+            <a:off x="4759947" y="2741623"/>
             <a:ext cx="91440" cy="91440"/>
           </a:xfrm>
           <a:prstGeom prst="ellipse">
@@ -9058,7 +9058,7 @@
         </p:nvSpPr>
         <p:spPr>
           <a:xfrm>
-            <a:off x="3081572" y="2467529"/>
+            <a:off x="4759947" y="2467529"/>
             <a:ext cx="91440" cy="91440"/>
           </a:xfrm>
           <a:prstGeom prst="ellipse">
@@ -9112,7 +9112,7 @@
         </p:nvSpPr>
         <p:spPr>
           <a:xfrm>
-            <a:off x="2798854" y="3296533"/>
+            <a:off x="4477229" y="3296533"/>
             <a:ext cx="91440" cy="91440"/>
           </a:xfrm>
           <a:prstGeom prst="ellipse">
@@ -9166,7 +9166,7 @@
         </p:nvSpPr>
         <p:spPr>
           <a:xfrm>
-            <a:off x="2798854" y="3023304"/>
+            <a:off x="4477229" y="3023304"/>
             <a:ext cx="91440" cy="91440"/>
           </a:xfrm>
           <a:prstGeom prst="ellipse">
@@ -9220,7 +9220,7 @@
         </p:nvSpPr>
         <p:spPr>
           <a:xfrm>
-            <a:off x="2798854" y="2741623"/>
+            <a:off x="4477229" y="2741623"/>
             <a:ext cx="91440" cy="91440"/>
           </a:xfrm>
           <a:prstGeom prst="ellipse">
@@ -9274,7 +9274,7 @@
         </p:nvSpPr>
         <p:spPr>
           <a:xfrm>
-            <a:off x="3655302" y="2741623"/>
+            <a:off x="5333677" y="2741623"/>
             <a:ext cx="91440" cy="91440"/>
           </a:xfrm>
           <a:prstGeom prst="ellipse">
@@ -9328,7 +9328,7 @@
         </p:nvSpPr>
         <p:spPr>
           <a:xfrm>
-            <a:off x="3655302" y="2467529"/>
+            <a:off x="5333677" y="2467529"/>
             <a:ext cx="91440" cy="91440"/>
           </a:xfrm>
           <a:prstGeom prst="ellipse">
@@ -9382,7 +9382,7 @@
         </p:nvSpPr>
         <p:spPr>
           <a:xfrm>
-            <a:off x="3655302" y="2185707"/>
+            <a:off x="5333677" y="2185707"/>
             <a:ext cx="91440" cy="91440"/>
           </a:xfrm>
           <a:prstGeom prst="ellipse">
@@ -9436,7 +9436,7 @@
         </p:nvSpPr>
         <p:spPr>
           <a:xfrm>
-            <a:off x="3081572" y="3296533"/>
+            <a:off x="4759947" y="3296533"/>
             <a:ext cx="91440" cy="91440"/>
           </a:xfrm>
           <a:prstGeom prst="ellipse">
@@ -9490,7 +9490,7 @@
         </p:nvSpPr>
         <p:spPr>
           <a:xfrm>
-            <a:off x="3081572" y="3578041"/>
+            <a:off x="4759947" y="3578041"/>
             <a:ext cx="91440" cy="91440"/>
           </a:xfrm>
           <a:prstGeom prst="ellipse">
@@ -9544,7 +9544,7 @@
         </p:nvSpPr>
         <p:spPr>
           <a:xfrm>
-            <a:off x="2798854" y="3578041"/>
+            <a:off x="4477229" y="3578041"/>
             <a:ext cx="91440" cy="91440"/>
           </a:xfrm>
           <a:prstGeom prst="ellipse">
@@ -9598,7 +9598,7 @@
         </p:nvSpPr>
         <p:spPr>
           <a:xfrm>
-            <a:off x="3368007" y="2185707"/>
+            <a:off x="5046382" y="2185707"/>
             <a:ext cx="91440" cy="91440"/>
           </a:xfrm>
           <a:prstGeom prst="ellipse">
@@ -9652,7 +9652,7 @@
         </p:nvSpPr>
         <p:spPr>
           <a:xfrm>
-            <a:off x="3938914" y="2467529"/>
+            <a:off x="5617289" y="2467529"/>
             <a:ext cx="91440" cy="91440"/>
           </a:xfrm>
           <a:prstGeom prst="ellipse">
@@ -9706,7 +9706,7 @@
         </p:nvSpPr>
         <p:spPr>
           <a:xfrm>
-            <a:off x="3938914" y="2185707"/>
+            <a:off x="5617289" y="2185707"/>
             <a:ext cx="91440" cy="91440"/>
           </a:xfrm>
           <a:prstGeom prst="ellipse">
@@ -9760,7 +9760,7 @@
         </p:nvSpPr>
         <p:spPr>
           <a:xfrm>
-            <a:off x="3938914" y="2741623"/>
+            <a:off x="5617289" y="2741623"/>
             <a:ext cx="91440" cy="91440"/>
           </a:xfrm>
           <a:prstGeom prst="ellipse">
@@ -9814,7 +9814,7 @@
         </p:nvSpPr>
         <p:spPr>
           <a:xfrm>
-            <a:off x="3938914" y="3023304"/>
+            <a:off x="5617289" y="3023304"/>
             <a:ext cx="91440" cy="91440"/>
           </a:xfrm>
           <a:prstGeom prst="ellipse">
@@ -9868,7 +9868,7 @@
         </p:nvSpPr>
         <p:spPr>
           <a:xfrm>
-            <a:off x="3938914" y="3296533"/>
+            <a:off x="5617289" y="3296533"/>
             <a:ext cx="91440" cy="91440"/>
           </a:xfrm>
           <a:prstGeom prst="ellipse">
@@ -9922,7 +9922,7 @@
         </p:nvSpPr>
         <p:spPr>
           <a:xfrm>
-            <a:off x="3938914" y="3578041"/>
+            <a:off x="5617289" y="3578041"/>
             <a:ext cx="91440" cy="91440"/>
           </a:xfrm>
           <a:prstGeom prst="ellipse">
@@ -9976,7 +9976,7 @@
         </p:nvSpPr>
         <p:spPr>
           <a:xfrm>
-            <a:off x="2798854" y="2185707"/>
+            <a:off x="4477229" y="2185707"/>
             <a:ext cx="91440" cy="91440"/>
           </a:xfrm>
           <a:prstGeom prst="ellipse">
@@ -10030,7 +10030,7 @@
         </p:nvSpPr>
         <p:spPr>
           <a:xfrm>
-            <a:off x="3081572" y="2185707"/>
+            <a:off x="4759947" y="2185707"/>
             <a:ext cx="91440" cy="91440"/>
           </a:xfrm>
           <a:prstGeom prst="ellipse">
@@ -10084,7 +10084,7 @@
         </p:nvSpPr>
         <p:spPr>
           <a:xfrm>
-            <a:off x="2798854" y="2467529"/>
+            <a:off x="4477229" y="2467529"/>
             <a:ext cx="91440" cy="91440"/>
           </a:xfrm>
           <a:prstGeom prst="ellipse">
@@ -10138,7 +10138,7 @@
         </p:nvSpPr>
         <p:spPr>
           <a:xfrm>
-            <a:off x="3655302" y="3023304"/>
+            <a:off x="5333677" y="3023304"/>
             <a:ext cx="91440" cy="91440"/>
           </a:xfrm>
           <a:prstGeom prst="ellipse">
@@ -10192,7 +10192,7 @@
         </p:nvSpPr>
         <p:spPr>
           <a:xfrm>
-            <a:off x="3655302" y="3296533"/>
+            <a:off x="5333677" y="3296533"/>
             <a:ext cx="91440" cy="91440"/>
           </a:xfrm>
           <a:prstGeom prst="ellipse">
@@ -10246,7 +10246,7 @@
         </p:nvSpPr>
         <p:spPr>
           <a:xfrm>
-            <a:off x="3655302" y="3578041"/>
+            <a:off x="5333677" y="3578041"/>
             <a:ext cx="91440" cy="91440"/>
           </a:xfrm>
           <a:prstGeom prst="ellipse">
@@ -10300,7 +10300,7 @@
         </p:nvSpPr>
         <p:spPr>
           <a:xfrm>
-            <a:off x="3368007" y="3296533"/>
+            <a:off x="5046382" y="3296533"/>
             <a:ext cx="91440" cy="91440"/>
           </a:xfrm>
           <a:prstGeom prst="ellipse">
@@ -10354,7 +10354,7 @@
         </p:nvSpPr>
         <p:spPr>
           <a:xfrm>
-            <a:off x="3368007" y="3578041"/>
+            <a:off x="5046382" y="3578041"/>
             <a:ext cx="91440" cy="91440"/>
           </a:xfrm>
           <a:prstGeom prst="ellipse">
@@ -10408,7 +10408,7 @@
         </p:nvSpPr>
         <p:spPr>
           <a:xfrm>
-            <a:off x="4755555" y="2755961"/>
+            <a:off x="6433930" y="2755961"/>
             <a:ext cx="91440" cy="91440"/>
           </a:xfrm>
           <a:prstGeom prst="ellipse">
@@ -10460,7 +10460,7 @@
         </p:nvSpPr>
         <p:spPr>
           <a:xfrm>
-            <a:off x="4992425" y="2617015"/>
+            <a:off x="6670800" y="2617015"/>
             <a:ext cx="1038746" cy="369332"/>
           </a:xfrm>
           <a:prstGeom prst="rect">
@@ -10497,7 +10497,7 @@
         </p:nvSpPr>
         <p:spPr>
           <a:xfrm>
-            <a:off x="4755555" y="3187728"/>
+            <a:off x="6433930" y="3187728"/>
             <a:ext cx="91440" cy="91440"/>
           </a:xfrm>
           <a:prstGeom prst="ellipse">
@@ -10549,7 +10549,7 @@
         </p:nvSpPr>
         <p:spPr>
           <a:xfrm>
-            <a:off x="4992425" y="3048782"/>
+            <a:off x="6670800" y="3048782"/>
             <a:ext cx="1489318" cy="369332"/>
           </a:xfrm>
           <a:prstGeom prst="rect">
@@ -10584,7 +10584,7 @@
         </p:nvSpPr>
         <p:spPr>
           <a:xfrm>
-            <a:off x="4992425" y="3480549"/>
+            <a:off x="6670800" y="3480549"/>
             <a:ext cx="1218475" cy="369332"/>
           </a:xfrm>
           <a:prstGeom prst="rect">
@@ -10619,7 +10619,7 @@
         </p:nvSpPr>
         <p:spPr>
           <a:xfrm>
-            <a:off x="4992425" y="3912316"/>
+            <a:off x="6670800" y="3912316"/>
             <a:ext cx="441468" cy="369332"/>
           </a:xfrm>
           <a:prstGeom prst="rect">
@@ -10656,7 +10656,7 @@
         </p:nvSpPr>
         <p:spPr>
           <a:xfrm>
-            <a:off x="4755555" y="3613885"/>
+            <a:off x="6433930" y="3613885"/>
             <a:ext cx="91440" cy="91440"/>
           </a:xfrm>
           <a:prstGeom prst="ellipse">
@@ -10710,7 +10710,7 @@
         </p:nvSpPr>
         <p:spPr>
           <a:xfrm>
-            <a:off x="4761195" y="4051262"/>
+            <a:off x="6439570" y="4051262"/>
             <a:ext cx="91440" cy="91440"/>
           </a:xfrm>
           <a:prstGeom prst="ellipse">
@@ -10762,7 +10762,7 @@
         </p:nvSpPr>
         <p:spPr>
           <a:xfrm>
-            <a:off x="1676827" y="1428808"/>
+            <a:off x="3355202" y="1428808"/>
             <a:ext cx="2842766" cy="369332"/>
           </a:xfrm>
           <a:prstGeom prst="rect">
@@ -10799,7 +10799,7 @@
         </p:nvSpPr>
         <p:spPr>
           <a:xfrm>
-            <a:off x="3655302" y="2467529"/>
+            <a:off x="5333677" y="2467529"/>
             <a:ext cx="91440" cy="91440"/>
           </a:xfrm>
           <a:prstGeom prst="ellipse">
@@ -10853,7 +10853,7 @@
         </p:nvSpPr>
         <p:spPr>
           <a:xfrm>
-            <a:off x="3938914" y="2741623"/>
+            <a:off x="5617289" y="2741623"/>
             <a:ext cx="91440" cy="91440"/>
           </a:xfrm>
           <a:prstGeom prst="ellipse">
@@ -10905,7 +10905,7 @@
         </p:nvSpPr>
         <p:spPr>
           <a:xfrm>
-            <a:off x="3673593" y="1983156"/>
+            <a:off x="5351968" y="1983156"/>
             <a:ext cx="364202" cy="261610"/>
           </a:xfrm>
           <a:prstGeom prst="rect">
@@ -10940,7 +10940,7 @@
         </p:nvSpPr>
         <p:spPr>
           <a:xfrm>
-            <a:off x="3386045" y="1983156"/>
+            <a:off x="5064420" y="1983156"/>
             <a:ext cx="356188" cy="253916"/>
           </a:xfrm>
           <a:prstGeom prst="rect">
@@ -10975,7 +10975,7 @@
         </p:nvSpPr>
         <p:spPr>
           <a:xfrm>
-            <a:off x="3098497" y="1983156"/>
+            <a:off x="4776872" y="1983156"/>
             <a:ext cx="356188" cy="253916"/>
           </a:xfrm>
           <a:prstGeom prst="rect">
@@ -11010,7 +11010,7 @@
         </p:nvSpPr>
         <p:spPr>
           <a:xfrm>
-            <a:off x="3947000" y="2259849"/>
+            <a:off x="5625375" y="2259849"/>
             <a:ext cx="397866" cy="253916"/>
           </a:xfrm>
           <a:prstGeom prst="rect">
@@ -11045,7 +11045,7 @@
         </p:nvSpPr>
         <p:spPr>
           <a:xfrm>
-            <a:off x="3639929" y="2259849"/>
+            <a:off x="5318304" y="2259849"/>
             <a:ext cx="397866" cy="253916"/>
           </a:xfrm>
           <a:prstGeom prst="rect">
@@ -11080,7 +11080,7 @@
         </p:nvSpPr>
         <p:spPr>
           <a:xfrm>
-            <a:off x="3098497" y="2259849"/>
+            <a:off x="4776872" y="2259849"/>
             <a:ext cx="356188" cy="253916"/>
           </a:xfrm>
           <a:prstGeom prst="rect">
@@ -11115,7 +11115,7 @@
         </p:nvSpPr>
         <p:spPr>
           <a:xfrm>
-            <a:off x="2814132" y="2259849"/>
+            <a:off x="4492507" y="2259849"/>
             <a:ext cx="356188" cy="253916"/>
           </a:xfrm>
           <a:prstGeom prst="rect">
@@ -11150,7 +11150,7 @@
         </p:nvSpPr>
         <p:spPr>
           <a:xfrm>
-            <a:off x="2531892" y="2526983"/>
+            <a:off x="4210267" y="2526983"/>
             <a:ext cx="356188" cy="253916"/>
           </a:xfrm>
           <a:prstGeom prst="rect">
@@ -11185,7 +11185,7 @@
         </p:nvSpPr>
         <p:spPr>
           <a:xfrm>
-            <a:off x="2814132" y="2526983"/>
+            <a:off x="4492507" y="2526983"/>
             <a:ext cx="356188" cy="253916"/>
           </a:xfrm>
           <a:prstGeom prst="rect">
@@ -11220,7 +11220,7 @@
         </p:nvSpPr>
         <p:spPr>
           <a:xfrm>
-            <a:off x="3344367" y="2526983"/>
+            <a:off x="5022742" y="2526983"/>
             <a:ext cx="397866" cy="253916"/>
           </a:xfrm>
           <a:prstGeom prst="rect">
@@ -11255,7 +11255,7 @@
         </p:nvSpPr>
         <p:spPr>
           <a:xfrm>
-            <a:off x="3639929" y="2526983"/>
+            <a:off x="5318304" y="2526983"/>
             <a:ext cx="397866" cy="253916"/>
           </a:xfrm>
           <a:prstGeom prst="rect">
@@ -11290,7 +11290,7 @@
         </p:nvSpPr>
         <p:spPr>
           <a:xfrm>
-            <a:off x="2531892" y="2808198"/>
+            <a:off x="4210267" y="2808198"/>
             <a:ext cx="356188" cy="253916"/>
           </a:xfrm>
           <a:prstGeom prst="rect">
@@ -11325,7 +11325,7 @@
         </p:nvSpPr>
         <p:spPr>
           <a:xfrm>
-            <a:off x="2531892" y="3089413"/>
+            <a:off x="4210267" y="3089413"/>
             <a:ext cx="356188" cy="253916"/>
           </a:xfrm>
           <a:prstGeom prst="rect">
@@ -11360,7 +11360,7 @@
         </p:nvSpPr>
         <p:spPr>
           <a:xfrm>
-            <a:off x="2531892" y="3370628"/>
+            <a:off x="4210267" y="3370628"/>
             <a:ext cx="356188" cy="253916"/>
           </a:xfrm>
           <a:prstGeom prst="rect">
@@ -11395,7 +11395,7 @@
         </p:nvSpPr>
         <p:spPr>
           <a:xfrm>
-            <a:off x="3056819" y="3370628"/>
+            <a:off x="4735194" y="3370628"/>
             <a:ext cx="397866" cy="253916"/>
           </a:xfrm>
           <a:prstGeom prst="rect">
@@ -11430,7 +11430,7 @@
         </p:nvSpPr>
         <p:spPr>
           <a:xfrm>
-            <a:off x="3056819" y="3090409"/>
+            <a:off x="4735194" y="3090409"/>
             <a:ext cx="397866" cy="253916"/>
           </a:xfrm>
           <a:prstGeom prst="rect">
@@ -11465,7 +11465,7 @@
         </p:nvSpPr>
         <p:spPr>
           <a:xfrm>
-            <a:off x="3056819" y="2808198"/>
+            <a:off x="4735194" y="2808198"/>
             <a:ext cx="397866" cy="253916"/>
           </a:xfrm>
           <a:prstGeom prst="rect">
@@ -11500,7 +11500,7 @@
         </p:nvSpPr>
         <p:spPr>
           <a:xfrm>
-            <a:off x="3344367" y="2808198"/>
+            <a:off x="5022742" y="2808198"/>
             <a:ext cx="397866" cy="253916"/>
           </a:xfrm>
           <a:prstGeom prst="rect">
@@ -11537,7 +11537,7 @@
         </p:nvCxnSpPr>
         <p:spPr>
           <a:xfrm flipH="1">
-            <a:off x="3723879" y="2543631"/>
+            <a:off x="5402254" y="2543631"/>
             <a:ext cx="227190" cy="223143"/>
           </a:xfrm>
           <a:prstGeom prst="line">
@@ -11584,7 +11584,7 @@
         </p:nvCxnSpPr>
         <p:spPr>
           <a:xfrm>
-            <a:off x="3910015" y="2589367"/>
+            <a:off x="5588390" y="2589367"/>
             <a:ext cx="48485" cy="166594"/>
           </a:xfrm>
           <a:prstGeom prst="line">
@@ -11629,7 +11629,7 @@
         </p:nvSpPr>
         <p:spPr>
           <a:xfrm>
-            <a:off x="3947000" y="2526983"/>
+            <a:off x="5625375" y="2526983"/>
             <a:ext cx="397866" cy="253916"/>
           </a:xfrm>
           <a:prstGeom prst="rect">

</xml_diff>